<commit_message>
bootstrap and graphs finish
</commit_message>
<xml_diff>
--- a/Annexe/Bigscreen.pptx
+++ b/Annexe/Bigscreen.pptx
@@ -120,6 +120,11 @@
       </a:defRPr>
     </a:lvl9pPr>
   </p:defaultTextStyle>
+  <p:extLst>
+    <p:ext uri="{EFAFB233-063F-42B5-8137-9DF3F51BA10A}">
+      <p15:sldGuideLst xmlns:p15="http://schemas.microsoft.com/office/powerpoint/2012/main"/>
+    </p:ext>
+  </p:extLst>
 </p:presentation>
 </file>
 
@@ -205,7 +210,7 @@
           <a:p>
             <a:fld id="{1CAE55F0-ABDB-4ABC-A64B-76B16AF8392D}" type="datetimeFigureOut">
               <a:rPr lang="fr-FR" smtClean="0"/>
-              <a:t>15/11/2022</a:t>
+              <a:t>18/11/2022</a:t>
             </a:fld>
             <a:endParaRPr lang="fr-FR" dirty="0"/>
           </a:p>
@@ -856,7 +861,7 @@
           <a:p>
             <a:fld id="{EDE04197-CBE0-4F44-851D-9804EC07D069}" type="datetimeFigureOut">
               <a:rPr lang="fr-FR" smtClean="0"/>
-              <a:t>15/11/2022</a:t>
+              <a:t>18/11/2022</a:t>
             </a:fld>
             <a:endParaRPr lang="fr-FR" dirty="0"/>
           </a:p>
@@ -1026,7 +1031,7 @@
           <a:p>
             <a:fld id="{EDE04197-CBE0-4F44-851D-9804EC07D069}" type="datetimeFigureOut">
               <a:rPr lang="fr-FR" smtClean="0"/>
-              <a:t>15/11/2022</a:t>
+              <a:t>18/11/2022</a:t>
             </a:fld>
             <a:endParaRPr lang="fr-FR" dirty="0"/>
           </a:p>
@@ -1206,7 +1211,7 @@
           <a:p>
             <a:fld id="{EDE04197-CBE0-4F44-851D-9804EC07D069}" type="datetimeFigureOut">
               <a:rPr lang="fr-FR" smtClean="0"/>
-              <a:t>15/11/2022</a:t>
+              <a:t>18/11/2022</a:t>
             </a:fld>
             <a:endParaRPr lang="fr-FR" dirty="0"/>
           </a:p>
@@ -1376,7 +1381,7 @@
           <a:p>
             <a:fld id="{EDE04197-CBE0-4F44-851D-9804EC07D069}" type="datetimeFigureOut">
               <a:rPr lang="fr-FR" smtClean="0"/>
-              <a:t>15/11/2022</a:t>
+              <a:t>18/11/2022</a:t>
             </a:fld>
             <a:endParaRPr lang="fr-FR" dirty="0"/>
           </a:p>
@@ -1622,7 +1627,7 @@
           <a:p>
             <a:fld id="{EDE04197-CBE0-4F44-851D-9804EC07D069}" type="datetimeFigureOut">
               <a:rPr lang="fr-FR" smtClean="0"/>
-              <a:t>15/11/2022</a:t>
+              <a:t>18/11/2022</a:t>
             </a:fld>
             <a:endParaRPr lang="fr-FR" dirty="0"/>
           </a:p>
@@ -1854,7 +1859,7 @@
           <a:p>
             <a:fld id="{EDE04197-CBE0-4F44-851D-9804EC07D069}" type="datetimeFigureOut">
               <a:rPr lang="fr-FR" smtClean="0"/>
-              <a:t>15/11/2022</a:t>
+              <a:t>18/11/2022</a:t>
             </a:fld>
             <a:endParaRPr lang="fr-FR" dirty="0"/>
           </a:p>
@@ -2221,7 +2226,7 @@
           <a:p>
             <a:fld id="{EDE04197-CBE0-4F44-851D-9804EC07D069}" type="datetimeFigureOut">
               <a:rPr lang="fr-FR" smtClean="0"/>
-              <a:t>15/11/2022</a:t>
+              <a:t>18/11/2022</a:t>
             </a:fld>
             <a:endParaRPr lang="fr-FR" dirty="0"/>
           </a:p>
@@ -2339,7 +2344,7 @@
           <a:p>
             <a:fld id="{EDE04197-CBE0-4F44-851D-9804EC07D069}" type="datetimeFigureOut">
               <a:rPr lang="fr-FR" smtClean="0"/>
-              <a:t>15/11/2022</a:t>
+              <a:t>18/11/2022</a:t>
             </a:fld>
             <a:endParaRPr lang="fr-FR" dirty="0"/>
           </a:p>
@@ -2434,7 +2439,7 @@
           <a:p>
             <a:fld id="{EDE04197-CBE0-4F44-851D-9804EC07D069}" type="datetimeFigureOut">
               <a:rPr lang="fr-FR" smtClean="0"/>
-              <a:t>15/11/2022</a:t>
+              <a:t>18/11/2022</a:t>
             </a:fld>
             <a:endParaRPr lang="fr-FR" dirty="0"/>
           </a:p>
@@ -2711,7 +2716,7 @@
           <a:p>
             <a:fld id="{EDE04197-CBE0-4F44-851D-9804EC07D069}" type="datetimeFigureOut">
               <a:rPr lang="fr-FR" smtClean="0"/>
-              <a:t>15/11/2022</a:t>
+              <a:t>18/11/2022</a:t>
             </a:fld>
             <a:endParaRPr lang="fr-FR" dirty="0"/>
           </a:p>
@@ -2964,7 +2969,7 @@
           <a:p>
             <a:fld id="{EDE04197-CBE0-4F44-851D-9804EC07D069}" type="datetimeFigureOut">
               <a:rPr lang="fr-FR" smtClean="0"/>
-              <a:t>15/11/2022</a:t>
+              <a:t>18/11/2022</a:t>
             </a:fld>
             <a:endParaRPr lang="fr-FR" dirty="0"/>
           </a:p>
@@ -3177,7 +3182,7 @@
           <a:p>
             <a:fld id="{EDE04197-CBE0-4F44-851D-9804EC07D069}" type="datetimeFigureOut">
               <a:rPr lang="fr-FR" smtClean="0"/>
-              <a:t>15/11/2022</a:t>
+              <a:t>18/11/2022</a:t>
             </a:fld>
             <a:endParaRPr lang="fr-FR" dirty="0"/>
           </a:p>
@@ -3638,11 +3643,11 @@
   <p:clrMapOvr>
     <a:masterClrMapping/>
   </p:clrMapOvr>
-  <mc:AlternateContent xmlns:mc="http://schemas.openxmlformats.org/markup-compatibility/2006">
-    <mc:Choice xmlns:p14="http://schemas.microsoft.com/office/powerpoint/2010/main" Requires="p14">
+  <mc:AlternateContent xmlns:mc="http://schemas.openxmlformats.org/markup-compatibility/2006" xmlns:p14="http://schemas.microsoft.com/office/powerpoint/2010/main">
+    <mc:Choice Requires="p14">
       <p:transition spd="slow" p14:dur="2000"/>
     </mc:Choice>
-    <mc:Fallback>
+    <mc:Fallback xmlns="">
       <p:transition spd="slow"/>
     </mc:Fallback>
   </mc:AlternateContent>
@@ -3790,11 +3795,7 @@
             </a:pPr>
             <a:r>
               <a:rPr lang="fr-FR" sz="2000" b="0" dirty="0" smtClean="0"/>
-              <a:t>Il y a 3 colonnes  qui comportent </a:t>
-            </a:r>
-            <a:r>
-              <a:rPr lang="fr-FR" sz="2000" b="0" dirty="0" smtClean="0"/>
-              <a:t>le numéro, la question et la réponse</a:t>
+              <a:t>Il y a 3 colonnes  qui comportent le numéro, la question et la réponse</a:t>
             </a:r>
             <a:endParaRPr lang="fr-FR" sz="2000" b="0" dirty="0"/>
           </a:p>
@@ -4106,7 +4107,61 @@
             </a:r>
             <a:r>
               <a:rPr lang="fr-FR" dirty="0" smtClean="0"/>
-              <a:t> et zoning</a:t>
+              <a:t> et </a:t>
+            </a:r>
+            <a:r>
+              <a:rPr lang="fr-FR" dirty="0" smtClean="0"/>
+              <a:t>zoning</a:t>
+            </a:r>
+          </a:p>
+          <a:p>
+            <a:r>
+              <a:rPr lang="fr-FR" dirty="0" smtClean="0"/>
+              <a:t>Utilisation de </a:t>
+            </a:r>
+            <a:r>
+              <a:rPr lang="fr-FR" dirty="0" err="1" smtClean="0"/>
+              <a:t>trello</a:t>
+            </a:r>
+            <a:r>
+              <a:rPr lang="fr-FR" dirty="0" smtClean="0"/>
+              <a:t> pour la méthodologie </a:t>
+            </a:r>
+          </a:p>
+          <a:p>
+            <a:r>
+              <a:rPr lang="fr-FR" dirty="0" smtClean="0"/>
+              <a:t>Utilisation de </a:t>
+            </a:r>
+            <a:r>
+              <a:rPr lang="fr-FR" dirty="0" err="1" smtClean="0"/>
+              <a:t>php</a:t>
+            </a:r>
+            <a:r>
+              <a:rPr lang="fr-FR" dirty="0" smtClean="0"/>
+              <a:t> </a:t>
+            </a:r>
+            <a:r>
+              <a:rPr lang="fr-FR" dirty="0" err="1" smtClean="0"/>
+              <a:t>workbench</a:t>
+            </a:r>
+            <a:r>
+              <a:rPr lang="fr-FR" dirty="0" smtClean="0"/>
+              <a:t> pour l’intégration de la base de données</a:t>
+            </a:r>
+          </a:p>
+          <a:p>
+            <a:r>
+              <a:rPr lang="fr-FR" dirty="0" smtClean="0"/>
+              <a:t>Utilisation de </a:t>
+            </a:r>
+            <a:r>
+              <a:rPr lang="fr-FR" dirty="0" err="1" smtClean="0"/>
+              <a:t>laravel</a:t>
+            </a:r>
+            <a:r>
+              <a:rPr lang="fr-FR" dirty="0" smtClean="0"/>
+              <a:t> pour la création du site.</a:t>
             </a:r>
             <a:endParaRPr lang="fr-FR" dirty="0"/>
           </a:p>
@@ -5361,11 +5416,7 @@
             </a:r>
             <a:r>
               <a:rPr lang="fr-CA" sz="2000" i="1" dirty="0" smtClean="0"/>
-              <a:t>  </a:t>
-            </a:r>
-            <a:r>
-              <a:rPr lang="fr-CA" sz="2000" i="1" dirty="0" smtClean="0"/>
-              <a:t>Grâce à votre investissement, nous vous préparons une application</a:t>
+              <a:t>  Grâce à votre investissement, nous vous préparons une application</a:t>
             </a:r>
           </a:p>
           <a:p>
@@ -5388,11 +5439,7 @@
             </a:r>
             <a:r>
               <a:rPr lang="fr-CA" sz="2000" i="1" dirty="0" smtClean="0"/>
-              <a:t>  </a:t>
-            </a:r>
-            <a:r>
-              <a:rPr lang="fr-CA" sz="2000" i="1" dirty="0" smtClean="0"/>
-              <a:t>Si vous désirez consulter vos réponse ultérieurement, vous pouvez</a:t>
+              <a:t>  Si vous désirez consulter vos réponse ultérieurement, vous pouvez</a:t>
             </a:r>
           </a:p>
           <a:p>
@@ -5610,15 +5657,7 @@
             </a:r>
             <a:r>
               <a:rPr lang="fr-CA" sz="2000" dirty="0" smtClean="0"/>
-              <a:t>validation, </a:t>
-            </a:r>
-            <a:r>
-              <a:rPr lang="fr-CA" sz="2000" dirty="0" smtClean="0"/>
-              <a:t>l’administrateur </a:t>
-            </a:r>
-            <a:r>
-              <a:rPr lang="fr-CA" sz="2000" dirty="0" smtClean="0"/>
-              <a:t>est </a:t>
+              <a:t>validation, l’administrateur est </a:t>
             </a:r>
             <a:r>
               <a:rPr lang="fr-CA" sz="2000" dirty="0"/>

</xml_diff>